<commit_message>
Updating to new mBlock Version
</commit_message>
<xml_diff>
--- a/presentation/de/d4k Workshop mbot.pptx
+++ b/presentation/de/d4k Workshop mbot.pptx
@@ -129,6 +129,10 @@
 </p:presentation>
 </file>
 
+<file path=ppt/revisionInfo.xml><?xml version="1.0" encoding="utf-8"?>
+<p1510:revInfo xmlns:a="http://schemas.openxmlformats.org/drawingml/2006/main" xmlns:r="http://schemas.openxmlformats.org/officeDocument/2006/relationships" xmlns:p1510="http://schemas.microsoft.com/office/powerpoint/2015/10/main"/>
+</file>
+
 <file path=ppt/slideLayouts/slideLayout1.xml><?xml version="1.0" encoding="utf-8"?>
 <p:sldLayout xmlns:a="http://schemas.openxmlformats.org/drawingml/2006/main" xmlns:r="http://schemas.openxmlformats.org/officeDocument/2006/relationships" xmlns:p="http://schemas.openxmlformats.org/presentationml/2006/main" preserve="1" userDrawn="1">
   <p:cSld name="Title Slide">
@@ -186,10 +190,9 @@
           <a:p>
             <a:pPr lvl="0"/>
             <a:r>
-              <a:rPr lang="de-DE" dirty="0" smtClean="0"/>
+              <a:rPr lang="de-DE" dirty="0"/>
               <a:t>Tue</a:t>
             </a:r>
-            <a:endParaRPr lang="de-DE" dirty="0"/>
           </a:p>
         </p:txBody>
       </p:sp>
@@ -242,10 +245,9 @@
           <a:p>
             <a:pPr lvl="0"/>
             <a:r>
-              <a:rPr lang="de-DE" dirty="0" smtClean="0"/>
+              <a:rPr lang="de-DE" dirty="0"/>
               <a:t>Alternatives (use provided tabs)</a:t>
             </a:r>
-            <a:endParaRPr lang="de-DE" dirty="0"/>
           </a:p>
         </p:txBody>
       </p:sp>
@@ -298,10 +300,9 @@
           <a:p>
             <a:pPr lvl="0"/>
             <a:r>
-              <a:rPr lang="de-DE" dirty="0" smtClean="0"/>
+              <a:rPr lang="de-DE" dirty="0"/>
               <a:t>Alternatives (use provided tabs)</a:t>
             </a:r>
-            <a:endParaRPr lang="de-DE" dirty="0"/>
           </a:p>
         </p:txBody>
       </p:sp>
@@ -345,10 +346,9 @@
           <a:p>
             <a:pPr lvl="0"/>
             <a:r>
-              <a:rPr lang="de-DE" dirty="0" smtClean="0"/>
+              <a:rPr lang="de-DE" dirty="0"/>
               <a:t>Tue</a:t>
             </a:r>
-            <a:endParaRPr lang="de-DE" dirty="0"/>
           </a:p>
         </p:txBody>
       </p:sp>
@@ -593,10 +593,9 @@
           <a:p>
             <a:pPr lvl="0"/>
             <a:r>
-              <a:rPr lang="de-DE" dirty="0" smtClean="0"/>
+              <a:rPr lang="de-DE" dirty="0"/>
               <a:t>Tue</a:t>
             </a:r>
-            <a:endParaRPr lang="de-DE" dirty="0"/>
           </a:p>
         </p:txBody>
       </p:sp>
@@ -649,10 +648,9 @@
           <a:p>
             <a:pPr lvl="0"/>
             <a:r>
-              <a:rPr lang="de-DE" dirty="0" smtClean="0"/>
+              <a:rPr lang="de-DE" dirty="0"/>
               <a:t>Alternatives (use provided tabs)</a:t>
             </a:r>
-            <a:endParaRPr lang="de-DE" dirty="0"/>
           </a:p>
         </p:txBody>
       </p:sp>
@@ -705,10 +703,9 @@
           <a:p>
             <a:pPr lvl="0"/>
             <a:r>
-              <a:rPr lang="de-DE" dirty="0" smtClean="0"/>
+              <a:rPr lang="de-DE" dirty="0"/>
               <a:t>Alternatives (use provided tabs)</a:t>
             </a:r>
-            <a:endParaRPr lang="de-DE" dirty="0"/>
           </a:p>
         </p:txBody>
       </p:sp>
@@ -752,10 +749,9 @@
           <a:p>
             <a:pPr lvl="0"/>
             <a:r>
-              <a:rPr lang="de-DE" dirty="0" smtClean="0"/>
+              <a:rPr lang="de-DE" dirty="0"/>
               <a:t>Tue</a:t>
             </a:r>
-            <a:endParaRPr lang="de-DE" dirty="0"/>
           </a:p>
         </p:txBody>
       </p:sp>
@@ -1184,7 +1180,7 @@
               <a:t>‹Nr.›</a:t>
             </a:fld>
             <a:r>
-              <a:rPr kumimoji="0" lang="de-DE" sz="1200" b="0" i="0" u="none" strike="noStrike" kern="1200" cap="none" spc="0" normalizeH="0" baseline="0" noProof="0" dirty="0" smtClean="0">
+              <a:rPr kumimoji="0" lang="de-DE" sz="1200" b="0" i="0" u="none" strike="noStrike" kern="1200" cap="none" spc="0" normalizeH="0" baseline="0" noProof="0" dirty="0">
                 <a:ln>
                   <a:noFill/>
                 </a:ln>
@@ -1391,7 +1387,7 @@
               <a:t>‹Nr.›</a:t>
             </a:fld>
             <a:r>
-              <a:rPr kumimoji="0" lang="de-DE" sz="1200" b="0" i="0" u="none" strike="noStrike" kern="1200" cap="none" spc="0" normalizeH="0" baseline="0" noProof="0" dirty="0" smtClean="0">
+              <a:rPr kumimoji="0" lang="de-DE" sz="1200" b="0" i="0" u="none" strike="noStrike" kern="1200" cap="none" spc="0" normalizeH="0" baseline="0" noProof="0" dirty="0">
                 <a:ln>
                   <a:noFill/>
                 </a:ln>
@@ -1711,7 +1707,7 @@
           <a:graphicData uri="http://schemas.openxmlformats.org/presentationml/2006/ole">
             <mc:AlternateContent xmlns:mc="http://schemas.openxmlformats.org/markup-compatibility/2006">
               <mc:Choice xmlns:v="urn:schemas-microsoft-com:vml" Requires="v">
-                <p:oleObj spid="_x0000_s1189" name="Image" r:id="rId3" imgW="3250794" imgH="2069841" progId="">
+                <p:oleObj spid="_x0000_s1192" name="Image" r:id="rId3" imgW="3250794" imgH="2069841" progId="">
                   <p:embed/>
                 </p:oleObj>
               </mc:Choice>
@@ -1808,7 +1804,7 @@
           <a:bodyPr rtlCol="0" anchor="ctr"/>
           <a:lstStyle/>
           <a:p>
-            <a:endParaRPr lang="en-US" dirty="0" smtClean="0">
+            <a:endParaRPr lang="en-US" dirty="0">
               <a:solidFill>
                 <a:schemeClr val="tx1"/>
               </a:solidFill>
@@ -1872,24 +1868,23 @@
           <a:p>
             <a:pPr algn="r"/>
             <a:r>
-              <a:rPr lang="de-DE" dirty="0" smtClean="0"/>
+              <a:rPr lang="de-DE" dirty="0"/>
               <a:t>Ein mbot Workshop</a:t>
             </a:r>
           </a:p>
           <a:p>
             <a:pPr algn="r"/>
             <a:r>
-              <a:rPr lang="de-DE" dirty="0" smtClean="0"/>
+              <a:rPr lang="de-DE" dirty="0"/>
               <a:t>für Kinder</a:t>
             </a:r>
           </a:p>
           <a:p>
             <a:pPr algn="r"/>
             <a:r>
-              <a:rPr lang="de-DE" sz="1100" dirty="0" smtClean="0"/>
+              <a:rPr lang="de-DE" sz="1100" dirty="0"/>
               <a:t>von Simon Rininsland und Stefan Höhn</a:t>
             </a:r>
-            <a:endParaRPr lang="de-DE" sz="1100" dirty="0"/>
           </a:p>
         </p:txBody>
       </p:sp>
@@ -1949,13 +1944,6 @@
   <p:clrMapOvr>
     <a:masterClrMapping/>
   </p:clrMapOvr>
-  <p:timing>
-    <p:tnLst>
-      <p:par>
-        <p:cTn id="1" dur="indefinite" restart="never" nodeType="tmRoot"/>
-      </p:par>
-    </p:tnLst>
-  </p:timing>
 </p:sld>
 </file>
 
@@ -1992,10 +1980,9 @@
           <a:lstStyle/>
           <a:p>
             <a:r>
-              <a:rPr lang="de-DE" dirty="0" smtClean="0"/>
+              <a:rPr lang="de-DE" dirty="0"/>
               <a:t>Was ist was hier?</a:t>
             </a:r>
-            <a:endParaRPr lang="de-DE" dirty="0"/>
           </a:p>
         </p:txBody>
       </p:sp>
@@ -2015,10 +2002,9 @@
           <a:lstStyle/>
           <a:p>
             <a:r>
-              <a:rPr lang="de-DE" dirty="0" smtClean="0"/>
+              <a:rPr lang="de-DE" dirty="0"/>
               <a:t>Wähle eine Figur</a:t>
             </a:r>
-            <a:endParaRPr lang="de-DE" dirty="0"/>
           </a:p>
         </p:txBody>
       </p:sp>
@@ -2044,7 +2030,7 @@
           <a:graphicData uri="http://schemas.openxmlformats.org/presentationml/2006/ole">
             <mc:AlternateContent xmlns:mc="http://schemas.openxmlformats.org/markup-compatibility/2006">
               <mc:Choice xmlns:v="urn:schemas-microsoft-com:vml" Requires="v">
-                <p:oleObj spid="_x0000_s9264" name="Image" r:id="rId3" imgW="3250794" imgH="2069841" progId="">
+                <p:oleObj spid="_x0000_s9270" name="Image" r:id="rId3" imgW="3250794" imgH="2069841" progId="">
                   <p:embed/>
                 </p:oleObj>
               </mc:Choice>
@@ -2120,7 +2106,7 @@
           <a:graphicData uri="http://schemas.openxmlformats.org/presentationml/2006/ole">
             <mc:AlternateContent xmlns:mc="http://schemas.openxmlformats.org/markup-compatibility/2006">
               <mc:Choice xmlns:v="urn:schemas-microsoft-com:vml" Requires="v">
-                <p:oleObj spid="_x0000_s9265" name="Image" r:id="rId5" imgW="4012698" imgH="2653968" progId="">
+                <p:oleObj spid="_x0000_s9271" name="Image" r:id="rId5" imgW="4012698" imgH="2653968" progId="">
                   <p:embed/>
                 </p:oleObj>
               </mc:Choice>
@@ -2269,10 +2255,9 @@
           <a:lstStyle/>
           <a:p>
             <a:r>
-              <a:rPr lang="de-DE" dirty="0" smtClean="0"/>
+              <a:rPr lang="de-DE" dirty="0"/>
               <a:t>Bühne</a:t>
             </a:r>
-            <a:endParaRPr lang="de-DE" dirty="0"/>
           </a:p>
         </p:txBody>
       </p:sp>
@@ -2299,10 +2284,9 @@
           <a:lstStyle/>
           <a:p>
             <a:r>
-              <a:rPr lang="de-DE" dirty="0" smtClean="0"/>
+              <a:rPr lang="de-DE" dirty="0"/>
               <a:t>Bausteinkasten</a:t>
             </a:r>
-            <a:endParaRPr lang="de-DE" dirty="0"/>
           </a:p>
         </p:txBody>
       </p:sp>
@@ -2329,10 +2313,9 @@
           <a:lstStyle/>
           <a:p>
             <a:r>
-              <a:rPr lang="de-DE" dirty="0" smtClean="0"/>
+              <a:rPr lang="de-DE" dirty="0"/>
               <a:t>Bauplatz</a:t>
             </a:r>
-            <a:endParaRPr lang="de-DE" dirty="0"/>
           </a:p>
         </p:txBody>
       </p:sp>
@@ -2446,13 +2429,6 @@
   <p:clrMapOvr>
     <a:masterClrMapping/>
   </p:clrMapOvr>
-  <p:timing>
-    <p:tnLst>
-      <p:par>
-        <p:cTn id="1" dur="indefinite" restart="never" nodeType="tmRoot"/>
-      </p:par>
-    </p:tnLst>
-  </p:timing>
 </p:sld>
 </file>
 
@@ -2489,10 +2465,9 @@
           <a:lstStyle/>
           <a:p>
             <a:r>
-              <a:rPr lang="de-DE" dirty="0" smtClean="0"/>
+              <a:rPr lang="de-DE" dirty="0"/>
               <a:t>Guten Morgen	Ich bin der Saurier	… für 5 Sekunden</a:t>
             </a:r>
-            <a:endParaRPr lang="de-DE" dirty="0"/>
           </a:p>
         </p:txBody>
       </p:sp>
@@ -2517,22 +2492,21 @@
           <a:lstStyle/>
           <a:p>
             <a:r>
-              <a:rPr lang="de-DE" dirty="0" smtClean="0"/>
+              <a:rPr lang="de-DE" dirty="0"/>
               <a:t>Noch ein „wenn Taste“ mit „runter“ und Richtung „nach unten“</a:t>
             </a:r>
           </a:p>
           <a:p>
             <a:r>
-              <a:rPr lang="de-DE" dirty="0" smtClean="0"/>
+              <a:rPr lang="de-DE" dirty="0"/>
               <a:t>Verwende 20 statt 10.</a:t>
             </a:r>
           </a:p>
           <a:p>
             <a:r>
-              <a:rPr lang="de-DE" dirty="0" smtClean="0"/>
+              <a:rPr lang="de-DE" dirty="0"/>
               <a:t>      Probiere es in allen Richtungen aus.</a:t>
             </a:r>
-            <a:endParaRPr lang="de-DE" dirty="0"/>
           </a:p>
         </p:txBody>
       </p:sp>
@@ -2557,16 +2531,15 @@
           <a:lstStyle/>
           <a:p>
             <a:r>
-              <a:rPr lang="de-DE" dirty="0" smtClean="0"/>
+              <a:rPr lang="de-DE" dirty="0"/>
               <a:t>Als Tipp:</a:t>
             </a:r>
           </a:p>
           <a:p>
             <a:r>
-              <a:rPr lang="de-DE" b="1" dirty="0" smtClean="0"/>
+              <a:rPr lang="de-DE" b="1" dirty="0"/>
               <a:t>Programmteile verdoppeln</a:t>
             </a:r>
-            <a:endParaRPr lang="de-DE" b="1" dirty="0"/>
           </a:p>
         </p:txBody>
       </p:sp>
@@ -2586,7 +2559,7 @@
           <a:lstStyle/>
           <a:p>
             <a:r>
-              <a:rPr lang="de-DE" smtClean="0"/>
+              <a:rPr lang="de-DE"/>
               <a:t>Sag Hallo</a:t>
             </a:r>
             <a:endParaRPr lang="de-DE" dirty="0"/>
@@ -2609,7 +2582,7 @@
           <a:lstStyle/>
           <a:p>
             <a:r>
-              <a:rPr lang="de-DE" smtClean="0"/>
+              <a:rPr lang="de-DE"/>
               <a:t>Ich lerne laufen…</a:t>
             </a:r>
             <a:endParaRPr lang="de-DE" dirty="0"/>
@@ -2638,7 +2611,7 @@
           <a:graphicData uri="http://schemas.openxmlformats.org/presentationml/2006/ole">
             <mc:AlternateContent xmlns:mc="http://schemas.openxmlformats.org/markup-compatibility/2006">
               <mc:Choice xmlns:v="urn:schemas-microsoft-com:vml" Requires="v">
-                <p:oleObj spid="_x0000_s2230" name="Image" r:id="rId3" imgW="3250794" imgH="2069841" progId="">
+                <p:oleObj spid="_x0000_s2236" name="Image" r:id="rId3" imgW="3250794" imgH="2069841" progId="">
                   <p:embed/>
                 </p:oleObj>
               </mc:Choice>
@@ -2714,7 +2687,7 @@
           <a:graphicData uri="http://schemas.openxmlformats.org/presentationml/2006/ole">
             <mc:AlternateContent xmlns:mc="http://schemas.openxmlformats.org/markup-compatibility/2006">
               <mc:Choice xmlns:v="urn:schemas-microsoft-com:vml" Requires="v">
-                <p:oleObj spid="_x0000_s2231" name="Image" r:id="rId5" imgW="4012698" imgH="2653968" progId="">
+                <p:oleObj spid="_x0000_s2237" name="Image" r:id="rId5" imgW="4012698" imgH="2653968" progId="">
                   <p:embed/>
                 </p:oleObj>
               </mc:Choice>
@@ -2814,10 +2787,9 @@
           <a:lstStyle/>
           <a:p>
             <a:r>
-              <a:rPr lang="de-DE" dirty="0" smtClean="0"/>
+              <a:rPr lang="de-DE" dirty="0"/>
               <a:t>und</a:t>
             </a:r>
-            <a:endParaRPr lang="de-DE" dirty="0"/>
           </a:p>
         </p:txBody>
       </p:sp>
@@ -2977,10 +2949,9 @@
           <a:lstStyle/>
           <a:p>
             <a:r>
-              <a:rPr lang="de-DE" dirty="0" smtClean="0"/>
+              <a:rPr lang="de-DE" dirty="0"/>
               <a:t>und</a:t>
             </a:r>
-            <a:endParaRPr lang="de-DE" dirty="0"/>
           </a:p>
         </p:txBody>
       </p:sp>
@@ -3215,13 +3186,6 @@
   <p:clrMapOvr>
     <a:masterClrMapping/>
   </p:clrMapOvr>
-  <p:timing>
-    <p:tnLst>
-      <p:par>
-        <p:cTn id="1" dur="indefinite" restart="never" nodeType="tmRoot"/>
-      </p:par>
-    </p:tnLst>
-  </p:timing>
 </p:sld>
 </file>
 
@@ -3263,16 +3227,15 @@
           <a:lstStyle/>
           <a:p>
             <a:r>
-              <a:rPr lang="de-DE" dirty="0" smtClean="0"/>
+              <a:rPr lang="de-DE" dirty="0"/>
               <a:t>Mache das Licht mit einer anderen Taste wieder aus.</a:t>
             </a:r>
           </a:p>
           <a:p>
             <a:r>
-              <a:rPr lang="de-DE" dirty="0" smtClean="0"/>
+              <a:rPr lang="de-DE" dirty="0"/>
               <a:t>Spiele Musik und mache Licht - wie in einer Diskothek.</a:t>
             </a:r>
-            <a:endParaRPr lang="de-DE" dirty="0"/>
           </a:p>
         </p:txBody>
       </p:sp>
@@ -3297,14 +3260,9 @@
           <a:lstStyle/>
           <a:p>
             <a:r>
-              <a:rPr lang="de-DE" dirty="0" smtClean="0"/>
-              <a:t>Probiere es mit allen Richtungen und verschiedenen Geschwindigkeiten aus</a:t>
-            </a:r>
-            <a:r>
-              <a:rPr lang="de-DE" dirty="0" smtClean="0"/>
-              <a:t>.</a:t>
-            </a:r>
-            <a:endParaRPr lang="de-DE" dirty="0" smtClean="0"/>
+              <a:rPr lang="de-DE" dirty="0"/>
+              <a:t>Probiere es mit allen Richtungen und verschiedenen Geschwindigkeiten aus.</a:t>
+            </a:r>
           </a:p>
         </p:txBody>
       </p:sp>
@@ -3329,22 +3287,17 @@
           <a:lstStyle/>
           <a:p>
             <a:r>
-              <a:rPr lang="de-DE" dirty="0" smtClean="0"/>
+              <a:rPr lang="de-DE" dirty="0"/>
               <a:t>Der </a:t>
             </a:r>
             <a:r>
-              <a:rPr lang="de-DE" dirty="0" err="1" smtClean="0"/>
+              <a:rPr lang="de-DE" dirty="0" err="1"/>
               <a:t>mBot</a:t>
             </a:r>
             <a:r>
-              <a:rPr lang="de-DE" dirty="0" smtClean="0"/>
-              <a:t> </a:t>
-            </a:r>
-            <a:r>
-              <a:rPr lang="de-DE" dirty="0" smtClean="0"/>
-              <a:t>piept und blinkt!</a:t>
-            </a:r>
-            <a:endParaRPr lang="de-DE" dirty="0"/>
+              <a:rPr lang="de-DE" dirty="0"/>
+              <a:t> piept und blinkt!</a:t>
+            </a:r>
           </a:p>
         </p:txBody>
       </p:sp>
@@ -3364,18 +3317,17 @@
           <a:lstStyle/>
           <a:p>
             <a:r>
-              <a:rPr lang="de-DE" dirty="0" smtClean="0"/>
+              <a:rPr lang="de-DE" dirty="0"/>
               <a:t>Der </a:t>
             </a:r>
             <a:r>
-              <a:rPr lang="de-DE" dirty="0" err="1" smtClean="0"/>
+              <a:rPr lang="de-DE" dirty="0" err="1"/>
               <a:t>mBot</a:t>
             </a:r>
             <a:r>
-              <a:rPr lang="de-DE" dirty="0" smtClean="0"/>
+              <a:rPr lang="de-DE" dirty="0"/>
               <a:t> lernt laufen</a:t>
             </a:r>
-            <a:endParaRPr lang="de-DE" dirty="0"/>
           </a:p>
         </p:txBody>
       </p:sp>
@@ -3401,7 +3353,7 @@
           <a:graphicData uri="http://schemas.openxmlformats.org/presentationml/2006/ole">
             <mc:AlternateContent xmlns:mc="http://schemas.openxmlformats.org/markup-compatibility/2006">
               <mc:Choice xmlns:v="urn:schemas-microsoft-com:vml" Requires="v">
-                <p:oleObj spid="_x0000_s3256" name="Image" r:id="rId3" imgW="3250794" imgH="2069841" progId="">
+                <p:oleObj spid="_x0000_s3262" name="Image" r:id="rId3" imgW="3250794" imgH="2069841" progId="">
                   <p:embed/>
                 </p:oleObj>
               </mc:Choice>
@@ -3477,7 +3429,7 @@
           <a:graphicData uri="http://schemas.openxmlformats.org/presentationml/2006/ole">
             <mc:AlternateContent xmlns:mc="http://schemas.openxmlformats.org/markup-compatibility/2006">
               <mc:Choice xmlns:v="urn:schemas-microsoft-com:vml" Requires="v">
-                <p:oleObj spid="_x0000_s3257" name="Image" r:id="rId5" imgW="4012698" imgH="2653968" progId="">
+                <p:oleObj spid="_x0000_s3263" name="Image" r:id="rId5" imgW="4012698" imgH="2653968" progId="">
                   <p:embed/>
                 </p:oleObj>
               </mc:Choice>
@@ -3554,10 +3506,9 @@
           <a:lstStyle/>
           <a:p>
             <a:r>
-              <a:rPr lang="de-DE" dirty="0" smtClean="0"/>
+              <a:rPr lang="de-DE" dirty="0"/>
               <a:t>und</a:t>
             </a:r>
-            <a:endParaRPr lang="de-DE" dirty="0"/>
           </a:p>
         </p:txBody>
       </p:sp>
@@ -3631,10 +3582,9 @@
           <a:lstStyle/>
           <a:p>
             <a:r>
-              <a:rPr lang="de-DE" dirty="0" smtClean="0"/>
+              <a:rPr lang="de-DE" dirty="0"/>
               <a:t>Licht steuern</a:t>
             </a:r>
-            <a:endParaRPr lang="de-DE" dirty="0"/>
           </a:p>
         </p:txBody>
       </p:sp>
@@ -3709,10 +3659,9 @@
           <a:lstStyle/>
           <a:p>
             <a:r>
-              <a:rPr lang="de-DE" dirty="0" smtClean="0"/>
+              <a:rPr lang="de-DE" dirty="0"/>
               <a:t>und</a:t>
             </a:r>
-            <a:endParaRPr lang="de-DE" dirty="0"/>
           </a:p>
         </p:txBody>
       </p:sp>
@@ -3732,7 +3681,7 @@
         </p:blipFill>
         <p:spPr>
           <a:xfrm>
-            <a:off x="438332" y="6265874"/>
+            <a:off x="3534564" y="5731520"/>
             <a:ext cx="2324100" cy="1238250"/>
           </a:xfrm>
           <a:prstGeom prst="rect">
@@ -3748,7 +3697,7 @@
         </p:nvSpPr>
         <p:spPr>
           <a:xfrm>
-            <a:off x="3370307" y="5382793"/>
+            <a:off x="314817" y="6273120"/>
             <a:ext cx="2000163" cy="369332"/>
           </a:xfrm>
           <a:prstGeom prst="rect">
@@ -3763,10 +3712,9 @@
           <a:lstStyle/>
           <a:p>
             <a:r>
-              <a:rPr lang="de-DE" dirty="0" smtClean="0"/>
+              <a:rPr lang="de-DE" dirty="0"/>
               <a:t>Der Not-Aus Knopf!</a:t>
             </a:r>
-            <a:endParaRPr lang="de-DE" dirty="0"/>
           </a:p>
         </p:txBody>
       </p:sp>
@@ -3858,7 +3806,7 @@
         </p:blipFill>
         <p:spPr>
           <a:xfrm>
-            <a:off x="3370307" y="5856299"/>
+            <a:off x="424921" y="6640473"/>
             <a:ext cx="2266950" cy="819150"/>
           </a:xfrm>
           <a:prstGeom prst="rect">
@@ -3876,13 +3824,6 @@
   <p:clrMapOvr>
     <a:masterClrMapping/>
   </p:clrMapOvr>
-  <p:timing>
-    <p:tnLst>
-      <p:par>
-        <p:cTn id="1" dur="indefinite" restart="never" nodeType="tmRoot"/>
-      </p:par>
-    </p:tnLst>
-  </p:timing>
 </p:sld>
 </file>
 
@@ -3924,28 +3865,23 @@
           <a:lstStyle/>
           <a:p>
             <a:r>
-              <a:rPr lang="de-DE" dirty="0" smtClean="0"/>
+              <a:rPr lang="de-DE" dirty="0"/>
               <a:t>Kombiniere es mit dem Laufen und stoppe den </a:t>
             </a:r>
             <a:r>
-              <a:rPr lang="de-DE" dirty="0" err="1" smtClean="0"/>
+              <a:rPr lang="de-DE" dirty="0" err="1"/>
               <a:t>mBot</a:t>
             </a:r>
             <a:r>
-              <a:rPr lang="de-DE" dirty="0" smtClean="0"/>
+              <a:rPr lang="de-DE" dirty="0"/>
               <a:t> in der Dunkelheit! </a:t>
             </a:r>
           </a:p>
           <a:p>
             <a:r>
               <a:rPr lang="de-DE" dirty="0"/>
-              <a:t> </a:t>
-            </a:r>
-            <a:r>
-              <a:rPr lang="de-DE" dirty="0" smtClean="0"/>
-              <a:t>   Mache im Dunkeln das Licht an!</a:t>
-            </a:r>
-            <a:endParaRPr lang="de-DE" dirty="0"/>
+              <a:t>    Mache im Dunkeln das Licht an!</a:t>
+            </a:r>
           </a:p>
         </p:txBody>
       </p:sp>
@@ -3970,10 +3906,9 @@
           <a:lstStyle/>
           <a:p>
             <a:r>
-              <a:rPr lang="de-DE" dirty="0" smtClean="0"/>
+              <a:rPr lang="de-DE" dirty="0"/>
               <a:t>Probiere verschiede Zahlen aus und benutze Töne anstatt Licht</a:t>
             </a:r>
-            <a:endParaRPr lang="de-DE" dirty="0"/>
           </a:p>
         </p:txBody>
       </p:sp>
@@ -3998,18 +3933,17 @@
           <a:lstStyle/>
           <a:p>
             <a:r>
-              <a:rPr lang="de-DE" sz="2800" dirty="0" smtClean="0"/>
+              <a:rPr lang="de-DE" sz="2800" dirty="0"/>
               <a:t>Der </a:t>
             </a:r>
             <a:r>
-              <a:rPr lang="de-DE" sz="2800" dirty="0" err="1" smtClean="0"/>
+              <a:rPr lang="de-DE" sz="2800" dirty="0" err="1"/>
               <a:t>mBot</a:t>
             </a:r>
             <a:r>
-              <a:rPr lang="de-DE" sz="2800" dirty="0" smtClean="0"/>
+              <a:rPr lang="de-DE" sz="2800" dirty="0"/>
               <a:t> hat Angst im Dunkeln</a:t>
             </a:r>
-            <a:endParaRPr lang="de-DE" sz="2800" dirty="0"/>
           </a:p>
         </p:txBody>
       </p:sp>
@@ -4034,18 +3968,17 @@
           <a:lstStyle/>
           <a:p>
             <a:r>
-              <a:rPr lang="de-DE" dirty="0" smtClean="0"/>
+              <a:rPr lang="de-DE" dirty="0"/>
               <a:t>Der </a:t>
             </a:r>
             <a:r>
-              <a:rPr lang="de-DE" dirty="0" err="1" smtClean="0"/>
+              <a:rPr lang="de-DE" dirty="0" err="1"/>
               <a:t>mBot</a:t>
             </a:r>
             <a:r>
-              <a:rPr lang="de-DE" dirty="0" smtClean="0"/>
+              <a:rPr lang="de-DE" dirty="0"/>
               <a:t> kann sehen!</a:t>
             </a:r>
-            <a:endParaRPr lang="de-DE" dirty="0"/>
           </a:p>
         </p:txBody>
       </p:sp>
@@ -4067,7 +4000,7 @@
           <a:graphicData uri="http://schemas.openxmlformats.org/presentationml/2006/ole">
             <mc:AlternateContent xmlns:mc="http://schemas.openxmlformats.org/markup-compatibility/2006">
               <mc:Choice xmlns:v="urn:schemas-microsoft-com:vml" Requires="v">
-                <p:oleObj spid="_x0000_s5264" name="Image" r:id="rId3" imgW="3250794" imgH="2069841" progId="">
+                <p:oleObj spid="_x0000_s5270" name="Image" r:id="rId3" imgW="3250794" imgH="2069841" progId="">
                   <p:embed/>
                 </p:oleObj>
               </mc:Choice>
@@ -4139,7 +4072,7 @@
           <a:graphicData uri="http://schemas.openxmlformats.org/presentationml/2006/ole">
             <mc:AlternateContent xmlns:mc="http://schemas.openxmlformats.org/markup-compatibility/2006">
               <mc:Choice xmlns:v="urn:schemas-microsoft-com:vml" Requires="v">
-                <p:oleObj spid="_x0000_s5265" name="Image" r:id="rId5" imgW="4012698" imgH="2653968" progId="">
+                <p:oleObj spid="_x0000_s5271" name="Image" r:id="rId5" imgW="4012698" imgH="2653968" progId="">
                   <p:embed/>
                 </p:oleObj>
               </mc:Choice>
@@ -4264,10 +4197,9 @@
           <a:lstStyle/>
           <a:p>
             <a:r>
-              <a:rPr lang="de-DE" dirty="0" smtClean="0"/>
+              <a:rPr lang="de-DE" dirty="0"/>
               <a:t>und</a:t>
             </a:r>
-            <a:endParaRPr lang="de-DE" dirty="0"/>
           </a:p>
         </p:txBody>
       </p:sp>
@@ -4367,9 +4299,44 @@
           </a:prstGeom>
         </p:spPr>
       </p:pic>
+      <p:sp>
+        <p:nvSpPr>
+          <p:cNvPr id="32" name="TextBox 24"/>
+          <p:cNvSpPr txBox="1"/>
+          <p:nvPr/>
+        </p:nvSpPr>
+        <p:spPr>
+          <a:xfrm>
+            <a:off x="445980" y="1285577"/>
+            <a:ext cx="2805512" cy="646331"/>
+          </a:xfrm>
+          <a:prstGeom prst="rect">
+            <a:avLst/>
+          </a:prstGeom>
+          <a:noFill/>
+        </p:spPr>
+        <p:txBody>
+          <a:bodyPr wrap="none" rtlCol="0">
+            <a:spAutoFit/>
+          </a:bodyPr>
+          <a:lstStyle/>
+          <a:p>
+            <a:r>
+              <a:rPr lang="de-DE" dirty="0"/>
+              <a:t>Die Figur sagt verschiedene </a:t>
+            </a:r>
+          </a:p>
+          <a:p>
+            <a:r>
+              <a:rPr lang="de-DE" dirty="0"/>
+              <a:t>Zahlen im Licht</a:t>
+            </a:r>
+          </a:p>
+        </p:txBody>
+      </p:sp>
       <p:pic>
         <p:nvPicPr>
-          <p:cNvPr id="6" name="Grafik 5"/>
+          <p:cNvPr id="5" name="Grafik 4"/>
           <p:cNvPicPr>
             <a:picLocks noChangeAspect="1"/>
           </p:cNvPicPr>
@@ -4383,8 +4350,8 @@
         </p:blipFill>
         <p:spPr>
           <a:xfrm>
-            <a:off x="463598" y="1992443"/>
-            <a:ext cx="2095500" cy="723900"/>
+            <a:off x="312017" y="6267542"/>
+            <a:ext cx="2505075" cy="657225"/>
           </a:xfrm>
           <a:prstGeom prst="rect">
             <a:avLst/>
@@ -4393,14 +4360,14 @@
       </p:pic>
       <p:sp>
         <p:nvSpPr>
-          <p:cNvPr id="32" name="TextBox 24"/>
+          <p:cNvPr id="24" name="TextBox 24"/>
           <p:cNvSpPr txBox="1"/>
           <p:nvPr/>
         </p:nvSpPr>
         <p:spPr>
           <a:xfrm>
-            <a:off x="445980" y="1285577"/>
-            <a:ext cx="2805512" cy="646331"/>
+            <a:off x="391596" y="6999982"/>
+            <a:ext cx="3035639" cy="369332"/>
           </a:xfrm>
           <a:prstGeom prst="rect">
             <a:avLst/>
@@ -4414,22 +4381,60 @@
           <a:lstStyle/>
           <a:p>
             <a:r>
-              <a:rPr lang="de-DE" dirty="0" smtClean="0"/>
-              <a:t>Die Figur sagt verschiedene </a:t>
-            </a:r>
-          </a:p>
-          <a:p>
-            <a:r>
-              <a:rPr lang="de-DE" dirty="0" smtClean="0"/>
-              <a:t>Zahlen im Licht</a:t>
-            </a:r>
-            <a:endParaRPr lang="de-DE" dirty="0"/>
+              <a:rPr lang="de-DE" dirty="0"/>
+              <a:t>Halte dem </a:t>
+            </a:r>
+            <a:r>
+              <a:rPr lang="de-DE" dirty="0" err="1"/>
+              <a:t>mBot</a:t>
+            </a:r>
+            <a:r>
+              <a:rPr lang="de-DE" dirty="0"/>
+              <a:t> die Augen zu.</a:t>
+            </a:r>
+          </a:p>
+        </p:txBody>
+      </p:sp>
+      <p:sp>
+        <p:nvSpPr>
+          <p:cNvPr id="31" name="TextBox 24"/>
+          <p:cNvSpPr txBox="1"/>
+          <p:nvPr/>
+        </p:nvSpPr>
+        <p:spPr>
+          <a:xfrm>
+            <a:off x="3427235" y="5264699"/>
+            <a:ext cx="2982188" cy="646331"/>
+          </a:xfrm>
+          <a:prstGeom prst="rect">
+            <a:avLst/>
+          </a:prstGeom>
+          <a:noFill/>
+        </p:spPr>
+        <p:txBody>
+          <a:bodyPr wrap="square" rtlCol="0">
+            <a:spAutoFit/>
+          </a:bodyPr>
+          <a:lstStyle/>
+          <a:p>
+            <a:r>
+              <a:rPr lang="de-DE" dirty="0"/>
+              <a:t>Der </a:t>
+            </a:r>
+            <a:r>
+              <a:rPr lang="de-DE" dirty="0" err="1"/>
+              <a:t>mBot</a:t>
+            </a:r>
+            <a:r>
+              <a:rPr lang="de-DE" dirty="0"/>
+              <a:t> sieht rot, wenn du ihm zu nahe kommst!</a:t>
+            </a:r>
           </a:p>
         </p:txBody>
       </p:sp>
       <p:pic>
         <p:nvPicPr>
-          <p:cNvPr id="8" name="Grafik 7"/>
+          <p:cNvPr id="7" name="Grafik 6"/>
           <p:cNvPicPr>
             <a:picLocks noChangeAspect="1"/>
           </p:cNvPicPr>
@@ -4443,48 +4448,24 @@
         </p:blipFill>
         <p:spPr>
           <a:xfrm>
-            <a:off x="3349688" y="1321946"/>
-            <a:ext cx="2952750" cy="1104900"/>
+            <a:off x="3408758" y="5973854"/>
+            <a:ext cx="3315279" cy="1271734"/>
           </a:xfrm>
           <a:prstGeom prst="rect">
             <a:avLst/>
           </a:prstGeom>
         </p:spPr>
       </p:pic>
-      <p:pic>
-        <p:nvPicPr>
-          <p:cNvPr id="5" name="Grafik 4"/>
-          <p:cNvPicPr>
-            <a:picLocks noChangeAspect="1"/>
-          </p:cNvPicPr>
-          <p:nvPr/>
-        </p:nvPicPr>
-        <p:blipFill>
-          <a:blip r:embed="rId13" cstate="print"/>
-          <a:stretch>
-            <a:fillRect/>
-          </a:stretch>
-        </p:blipFill>
-        <p:spPr>
-          <a:xfrm>
-            <a:off x="312017" y="6267542"/>
-            <a:ext cx="2505075" cy="657225"/>
-          </a:xfrm>
-          <a:prstGeom prst="rect">
-            <a:avLst/>
-          </a:prstGeom>
-        </p:spPr>
-      </p:pic>
-      <p:sp>
-        <p:nvSpPr>
-          <p:cNvPr id="24" name="TextBox 24"/>
+      <p:sp>
+        <p:nvSpPr>
+          <p:cNvPr id="28" name="TextBox 24"/>
           <p:cNvSpPr txBox="1"/>
           <p:nvPr/>
         </p:nvSpPr>
         <p:spPr>
           <a:xfrm>
-            <a:off x="391596" y="6999982"/>
-            <a:ext cx="3035639" cy="369332"/>
+            <a:off x="3251492" y="889898"/>
+            <a:ext cx="2884892" cy="369332"/>
           </a:xfrm>
           <a:prstGeom prst="rect">
             <a:avLst/>
@@ -4498,118 +4479,17 @@
           <a:lstStyle/>
           <a:p>
             <a:r>
-              <a:rPr lang="de-DE" dirty="0" smtClean="0"/>
-              <a:t>Halte dem </a:t>
-            </a:r>
-            <a:r>
-              <a:rPr lang="de-DE" dirty="0" err="1" smtClean="0"/>
+              <a:rPr lang="de-DE" dirty="0"/>
+              <a:t>Der </a:t>
+            </a:r>
+            <a:r>
+              <a:rPr lang="de-DE" dirty="0" err="1"/>
               <a:t>mBot</a:t>
             </a:r>
             <a:r>
-              <a:rPr lang="de-DE" dirty="0" smtClean="0"/>
-              <a:t> die Augen zu.</a:t>
-            </a:r>
-            <a:endParaRPr lang="de-DE" dirty="0"/>
-          </a:p>
-        </p:txBody>
-      </p:sp>
-      <p:sp>
-        <p:nvSpPr>
-          <p:cNvPr id="31" name="TextBox 24"/>
-          <p:cNvSpPr txBox="1"/>
-          <p:nvPr/>
-        </p:nvSpPr>
-        <p:spPr>
-          <a:xfrm>
-            <a:off x="3427235" y="5264699"/>
-            <a:ext cx="2982188" cy="646331"/>
-          </a:xfrm>
-          <a:prstGeom prst="rect">
-            <a:avLst/>
-          </a:prstGeom>
-          <a:noFill/>
-        </p:spPr>
-        <p:txBody>
-          <a:bodyPr wrap="square" rtlCol="0">
-            <a:spAutoFit/>
-          </a:bodyPr>
-          <a:lstStyle/>
-          <a:p>
-            <a:r>
-              <a:rPr lang="de-DE" dirty="0" smtClean="0"/>
-              <a:t>Der </a:t>
-            </a:r>
-            <a:r>
-              <a:rPr lang="de-DE" dirty="0" err="1" smtClean="0"/>
-              <a:t>mBot</a:t>
-            </a:r>
-            <a:r>
-              <a:rPr lang="de-DE" dirty="0" smtClean="0"/>
-              <a:t> sieht rot, wenn du ihm zu nahe kommst!</a:t>
-            </a:r>
-            <a:endParaRPr lang="de-DE" dirty="0"/>
-          </a:p>
-        </p:txBody>
-      </p:sp>
-      <p:pic>
-        <p:nvPicPr>
-          <p:cNvPr id="7" name="Grafik 6"/>
-          <p:cNvPicPr>
-            <a:picLocks noChangeAspect="1"/>
-          </p:cNvPicPr>
-          <p:nvPr/>
-        </p:nvPicPr>
-        <p:blipFill>
-          <a:blip r:embed="rId14" cstate="print"/>
-          <a:stretch>
-            <a:fillRect/>
-          </a:stretch>
-        </p:blipFill>
-        <p:spPr>
-          <a:xfrm>
-            <a:off x="3408758" y="5973854"/>
-            <a:ext cx="3315279" cy="1271734"/>
-          </a:xfrm>
-          <a:prstGeom prst="rect">
-            <a:avLst/>
-          </a:prstGeom>
-        </p:spPr>
-      </p:pic>
-      <p:sp>
-        <p:nvSpPr>
-          <p:cNvPr id="28" name="TextBox 24"/>
-          <p:cNvSpPr txBox="1"/>
-          <p:nvPr/>
-        </p:nvSpPr>
-        <p:spPr>
-          <a:xfrm>
-            <a:off x="3251492" y="889898"/>
-            <a:ext cx="2884892" cy="369332"/>
-          </a:xfrm>
-          <a:prstGeom prst="rect">
-            <a:avLst/>
-          </a:prstGeom>
-          <a:noFill/>
-        </p:spPr>
-        <p:txBody>
-          <a:bodyPr wrap="none" rtlCol="0">
-            <a:spAutoFit/>
-          </a:bodyPr>
-          <a:lstStyle/>
-          <a:p>
-            <a:r>
-              <a:rPr lang="de-DE" dirty="0" smtClean="0"/>
-              <a:t>Der </a:t>
-            </a:r>
-            <a:r>
-              <a:rPr lang="de-DE" dirty="0" err="1" smtClean="0"/>
-              <a:t>mBot</a:t>
-            </a:r>
-            <a:r>
-              <a:rPr lang="de-DE" dirty="0" smtClean="0"/>
+              <a:rPr lang="de-DE" dirty="0"/>
               <a:t> schreit im Dunkeln</a:t>
             </a:r>
-            <a:endParaRPr lang="de-DE" dirty="0"/>
           </a:p>
         </p:txBody>
       </p:sp>
@@ -4631,6 +4511,66 @@
           <a:xfrm>
             <a:off x="1026391" y="1006352"/>
             <a:ext cx="1076325" cy="200025"/>
+          </a:xfrm>
+          <a:prstGeom prst="rect">
+            <a:avLst/>
+          </a:prstGeom>
+        </p:spPr>
+      </p:pic>
+      <p:pic>
+        <p:nvPicPr>
+          <p:cNvPr id="9" name="Grafik 8">
+            <a:extLst>
+              <a:ext uri="{FF2B5EF4-FFF2-40B4-BE49-F238E27FC236}">
+                <a16:creationId xmlns:a16="http://schemas.microsoft.com/office/drawing/2014/main" id="{823863A5-36D5-4EA8-A9BE-D69207B17327}"/>
+              </a:ext>
+            </a:extLst>
+          </p:cNvPr>
+          <p:cNvPicPr>
+            <a:picLocks noChangeAspect="1"/>
+          </p:cNvPicPr>
+          <p:nvPr/>
+        </p:nvPicPr>
+        <p:blipFill>
+          <a:blip r:embed="rId13"/>
+          <a:stretch>
+            <a:fillRect/>
+          </a:stretch>
+        </p:blipFill>
+        <p:spPr>
+          <a:xfrm>
+            <a:off x="445981" y="2073866"/>
+            <a:ext cx="2694988" cy="744668"/>
+          </a:xfrm>
+          <a:prstGeom prst="rect">
+            <a:avLst/>
+          </a:prstGeom>
+        </p:spPr>
+      </p:pic>
+      <p:pic>
+        <p:nvPicPr>
+          <p:cNvPr id="6" name="Grafik 5">
+            <a:extLst>
+              <a:ext uri="{FF2B5EF4-FFF2-40B4-BE49-F238E27FC236}">
+                <a16:creationId xmlns:a16="http://schemas.microsoft.com/office/drawing/2014/main" id="{CA297DAE-A43A-4B3E-ADB1-AA49E8CB8D2D}"/>
+              </a:ext>
+            </a:extLst>
+          </p:cNvPr>
+          <p:cNvPicPr>
+            <a:picLocks noChangeAspect="1"/>
+          </p:cNvPicPr>
+          <p:nvPr/>
+        </p:nvPicPr>
+        <p:blipFill>
+          <a:blip r:embed="rId14"/>
+          <a:stretch>
+            <a:fillRect/>
+          </a:stretch>
+        </p:blipFill>
+        <p:spPr>
+          <a:xfrm>
+            <a:off x="3251491" y="1282571"/>
+            <a:ext cx="3472545" cy="1048640"/>
           </a:xfrm>
           <a:prstGeom prst="rect">
             <a:avLst/>
@@ -4647,13 +4587,6 @@
   <p:clrMapOvr>
     <a:masterClrMapping/>
   </p:clrMapOvr>
-  <p:timing>
-    <p:tnLst>
-      <p:par>
-        <p:cTn id="1" dur="indefinite" restart="never" nodeType="tmRoot"/>
-      </p:par>
-    </p:tnLst>
-  </p:timing>
 </p:sld>
 </file>
 
@@ -4695,46 +4628,29 @@
           <a:lstStyle/>
           <a:p>
             <a:r>
-              <a:rPr lang="de-DE" dirty="0" smtClean="0"/>
+              <a:rPr lang="de-DE" dirty="0"/>
               <a:t>Lasse den </a:t>
             </a:r>
             <a:r>
-              <a:rPr lang="de-DE" dirty="0" err="1" smtClean="0"/>
+              <a:rPr lang="de-DE" dirty="0" err="1"/>
               <a:t>mBot</a:t>
             </a:r>
             <a:r>
-              <a:rPr lang="de-DE" dirty="0" smtClean="0"/>
-              <a:t> nach vorne und nach hinten fahren. Verändere die Geschwindigkeiten und nehme Licht </a:t>
-            </a:r>
-            <a:r>
-              <a:rPr lang="de-DE" dirty="0" smtClean="0"/>
-              <a:t>dazu</a:t>
-            </a:r>
-            <a:r>
-              <a:rPr lang="de-DE" dirty="0" smtClean="0"/>
-              <a:t>.</a:t>
-            </a:r>
-          </a:p>
-          <a:p>
-            <a:r>
-              <a:rPr lang="de-DE" dirty="0"/>
-              <a:t> </a:t>
-            </a:r>
-            <a:r>
-              <a:rPr lang="de-DE" dirty="0" smtClean="0"/>
-              <a:t>   Füge dem Fahren vorher eine Sicherung hinzu, dass er nicht</a:t>
-            </a:r>
-          </a:p>
-          <a:p>
-            <a:r>
-              <a:rPr lang="de-DE" dirty="0"/>
-              <a:t> </a:t>
-            </a:r>
-            <a:r>
-              <a:rPr lang="de-DE" dirty="0" smtClean="0"/>
-              <a:t>   mehr gegen Wände fährt.</a:t>
-            </a:r>
-            <a:endParaRPr lang="de-DE" dirty="0"/>
+              <a:rPr lang="de-DE" dirty="0"/>
+              <a:t> nach vorne und nach hinten fahren. Verändere die Geschwindigkeiten und nehme Licht dazu.</a:t>
+            </a:r>
+          </a:p>
+          <a:p>
+            <a:r>
+              <a:rPr lang="de-DE" dirty="0"/>
+              <a:t>    Füge dem Fahren vorher eine Sicherung hinzu, dass er nicht</a:t>
+            </a:r>
+          </a:p>
+          <a:p>
+            <a:r>
+              <a:rPr lang="de-DE" dirty="0"/>
+              <a:t>    mehr gegen Wände fährt.</a:t>
+            </a:r>
           </a:p>
         </p:txBody>
       </p:sp>
@@ -4759,73 +4675,51 @@
           <a:lstStyle/>
           <a:p>
             <a:r>
-              <a:rPr lang="de-DE" dirty="0" smtClean="0"/>
+              <a:rPr lang="de-DE" dirty="0"/>
               <a:t>Lasse den </a:t>
             </a:r>
             <a:r>
-              <a:rPr lang="de-DE" dirty="0" err="1" smtClean="0"/>
+              <a:rPr lang="de-DE" dirty="0" err="1"/>
               <a:t>mBot</a:t>
             </a:r>
             <a:r>
-              <a:rPr lang="de-DE" dirty="0" smtClean="0"/>
+              <a:rPr lang="de-DE" dirty="0"/>
               <a:t> Angst im Dunkeln haben und bei zu naher Entfernung aufschreien!</a:t>
             </a:r>
           </a:p>
           <a:p>
             <a:r>
-              <a:rPr lang="de-DE" dirty="0" smtClean="0"/>
+              <a:rPr lang="de-DE" dirty="0"/>
               <a:t>Bei Hindernissen soll der </a:t>
             </a:r>
             <a:r>
-              <a:rPr lang="de-DE" dirty="0" err="1" smtClean="0"/>
+              <a:rPr lang="de-DE" dirty="0" err="1"/>
               <a:t>mBot</a:t>
             </a:r>
             <a:r>
-              <a:rPr lang="de-DE" dirty="0" smtClean="0"/>
+              <a:rPr lang="de-DE" dirty="0"/>
               <a:t> sich umschauen und in die </a:t>
             </a:r>
           </a:p>
           <a:p>
             <a:r>
               <a:rPr lang="de-DE" dirty="0"/>
-              <a:t> </a:t>
-            </a:r>
-            <a:r>
-              <a:rPr lang="de-DE" dirty="0" smtClean="0"/>
-              <a:t>      </a:t>
-            </a:r>
-            <a:r>
-              <a:rPr lang="de-DE" dirty="0" smtClean="0"/>
-              <a:t>Richtung fahren, wo mehr Platz ist.</a:t>
-            </a:r>
-            <a:endParaRPr lang="de-DE" dirty="0" smtClean="0"/>
-          </a:p>
-          <a:p>
-            <a:r>
-              <a:rPr lang="de-DE" dirty="0"/>
-              <a:t> </a:t>
-            </a:r>
-            <a:r>
-              <a:rPr lang="de-DE" dirty="0" smtClean="0"/>
-              <a:t>     Lasse den </a:t>
-            </a:r>
-            <a:r>
-              <a:rPr lang="de-DE" dirty="0" err="1" smtClean="0"/>
+              <a:t>       Richtung fahren, wo mehr Platz ist.</a:t>
+            </a:r>
+          </a:p>
+          <a:p>
+            <a:r>
+              <a:rPr lang="de-DE" dirty="0"/>
+              <a:t>      Lasse den </a:t>
+            </a:r>
+            <a:r>
+              <a:rPr lang="de-DE" dirty="0" err="1"/>
               <a:t>mBot</a:t>
             </a:r>
             <a:r>
-              <a:rPr lang="de-DE" dirty="0" smtClean="0"/>
-              <a:t> in der Dunkelheit </a:t>
-            </a:r>
-            <a:r>
-              <a:rPr lang="de-DE" dirty="0" smtClean="0"/>
-              <a:t>vorsichtig </a:t>
-            </a:r>
-            <a:r>
-              <a:rPr lang="de-DE" dirty="0" smtClean="0"/>
-              <a:t>fahren.</a:t>
-            </a:r>
-            <a:endParaRPr lang="de-DE" dirty="0"/>
+              <a:rPr lang="de-DE" dirty="0"/>
+              <a:t> in der Dunkelheit vorsichtig fahren.</a:t>
+            </a:r>
           </a:p>
         </p:txBody>
       </p:sp>
@@ -4850,18 +4744,17 @@
           <a:lstStyle/>
           <a:p>
             <a:r>
-              <a:rPr lang="de-DE" dirty="0" smtClean="0"/>
+              <a:rPr lang="de-DE" dirty="0"/>
               <a:t>Der </a:t>
             </a:r>
             <a:r>
-              <a:rPr lang="de-DE" dirty="0" err="1" smtClean="0"/>
+              <a:rPr lang="de-DE" dirty="0" err="1"/>
               <a:t>mBot</a:t>
             </a:r>
             <a:r>
-              <a:rPr lang="de-DE" dirty="0" smtClean="0"/>
+              <a:rPr lang="de-DE" dirty="0"/>
               <a:t> tanzt!</a:t>
             </a:r>
-            <a:endParaRPr lang="de-DE" dirty="0"/>
           </a:p>
         </p:txBody>
       </p:sp>
@@ -4886,18 +4779,17 @@
           <a:lstStyle/>
           <a:p>
             <a:r>
-              <a:rPr lang="de-DE" dirty="0" smtClean="0"/>
+              <a:rPr lang="de-DE" dirty="0"/>
               <a:t>Der </a:t>
             </a:r>
             <a:r>
-              <a:rPr lang="de-DE" dirty="0" err="1" smtClean="0"/>
+              <a:rPr lang="de-DE" dirty="0" err="1"/>
               <a:t>mBot</a:t>
             </a:r>
             <a:r>
-              <a:rPr lang="de-DE" dirty="0" smtClean="0"/>
+              <a:rPr lang="de-DE" dirty="0"/>
               <a:t> hat einen eigenen Kopf</a:t>
             </a:r>
-            <a:endParaRPr lang="de-DE" dirty="0"/>
           </a:p>
         </p:txBody>
       </p:sp>
@@ -4923,7 +4815,7 @@
           <a:graphicData uri="http://schemas.openxmlformats.org/presentationml/2006/ole">
             <mc:AlternateContent xmlns:mc="http://schemas.openxmlformats.org/markup-compatibility/2006">
               <mc:Choice xmlns:v="urn:schemas-microsoft-com:vml" Requires="v">
-                <p:oleObj spid="_x0000_s4268" name="Image" r:id="rId3" imgW="3250794" imgH="2069841" progId="">
+                <p:oleObj spid="_x0000_s4274" name="Image" r:id="rId3" imgW="3250794" imgH="2069841" progId="">
                   <p:embed/>
                 </p:oleObj>
               </mc:Choice>
@@ -4999,7 +4891,7 @@
           <a:graphicData uri="http://schemas.openxmlformats.org/presentationml/2006/ole">
             <mc:AlternateContent xmlns:mc="http://schemas.openxmlformats.org/markup-compatibility/2006">
               <mc:Choice xmlns:v="urn:schemas-microsoft-com:vml" Requires="v">
-                <p:oleObj spid="_x0000_s4269" name="Image" r:id="rId5" imgW="4012698" imgH="2653968" progId="">
+                <p:oleObj spid="_x0000_s4275" name="Image" r:id="rId5" imgW="4012698" imgH="2653968" progId="">
                   <p:embed/>
                 </p:oleObj>
               </mc:Choice>
@@ -5124,10 +5016,9 @@
           <a:lstStyle/>
           <a:p>
             <a:r>
-              <a:rPr lang="de-DE" dirty="0" smtClean="0"/>
+              <a:rPr lang="de-DE" dirty="0"/>
               <a:t>und</a:t>
             </a:r>
-            <a:endParaRPr lang="de-DE" dirty="0"/>
           </a:p>
         </p:txBody>
       </p:sp>
@@ -5298,18 +5189,17 @@
           <a:lstStyle/>
           <a:p>
             <a:r>
-              <a:rPr lang="de-DE" dirty="0" smtClean="0"/>
+              <a:rPr lang="de-DE" dirty="0"/>
               <a:t>Führe den </a:t>
             </a:r>
             <a:r>
-              <a:rPr lang="de-DE" dirty="0" err="1" smtClean="0"/>
+              <a:rPr lang="de-DE" dirty="0" err="1"/>
               <a:t>mBot</a:t>
             </a:r>
             <a:r>
-              <a:rPr lang="de-DE" dirty="0" smtClean="0"/>
+              <a:rPr lang="de-DE" dirty="0"/>
               <a:t> mit deiner Hand</a:t>
             </a:r>
-            <a:endParaRPr lang="de-DE" dirty="0"/>
           </a:p>
         </p:txBody>
       </p:sp>
@@ -5360,18 +5250,17 @@
           <a:lstStyle/>
           <a:p>
             <a:r>
-              <a:rPr lang="de-DE" dirty="0" smtClean="0"/>
+              <a:rPr lang="de-DE" dirty="0"/>
               <a:t>Der </a:t>
             </a:r>
             <a:r>
-              <a:rPr lang="de-DE" dirty="0" err="1" smtClean="0"/>
+              <a:rPr lang="de-DE" dirty="0" err="1"/>
               <a:t>mBot</a:t>
             </a:r>
             <a:r>
-              <a:rPr lang="de-DE" dirty="0" smtClean="0"/>
+              <a:rPr lang="de-DE" dirty="0"/>
               <a:t> sucht sich automatisch einen Weg</a:t>
             </a:r>
-            <a:endParaRPr lang="de-DE" dirty="0"/>
           </a:p>
         </p:txBody>
       </p:sp>
@@ -5409,13 +5298,6 @@
   <p:clrMapOvr>
     <a:masterClrMapping/>
   </p:clrMapOvr>
-  <p:timing>
-    <p:tnLst>
-      <p:par>
-        <p:cTn id="1" dur="indefinite" restart="never" nodeType="tmRoot"/>
-      </p:par>
-    </p:tnLst>
-  </p:timing>
 </p:sld>
 </file>
 
@@ -5457,10 +5339,9 @@
           <a:lstStyle/>
           <a:p>
             <a:r>
-              <a:rPr lang="de-DE" dirty="0" smtClean="0"/>
+              <a:rPr lang="de-DE" dirty="0"/>
               <a:t>Mentoren Cheat-Sheet</a:t>
             </a:r>
-            <a:endParaRPr lang="de-DE" dirty="0"/>
           </a:p>
         </p:txBody>
       </p:sp>
@@ -5511,47 +5392,45 @@
           <a:lstStyle/>
           <a:p>
             <a:r>
-              <a:rPr lang="de-DE" dirty="0" smtClean="0"/>
+              <a:rPr lang="de-DE" dirty="0"/>
               <a:t>1. Beschreibe den Kids den Aufbau des Programms (Folie 2a)</a:t>
             </a:r>
           </a:p>
           <a:p>
             <a:r>
-              <a:rPr lang="de-DE" dirty="0" smtClean="0"/>
+              <a:rPr lang="de-DE" dirty="0"/>
               <a:t>2. Zeige den </a:t>
             </a:r>
             <a:r>
-              <a:rPr lang="de-DE" dirty="0" err="1" smtClean="0"/>
+              <a:rPr lang="de-DE" dirty="0" err="1"/>
               <a:t>mBot</a:t>
             </a:r>
             <a:r>
-              <a:rPr lang="de-DE" dirty="0" smtClean="0"/>
+              <a:rPr lang="de-DE" dirty="0"/>
               <a:t> und erkläre die Sensoren und Aktoren</a:t>
             </a:r>
-            <a:endParaRPr lang="de-DE" dirty="0" smtClean="0"/>
-          </a:p>
-          <a:p>
-            <a:r>
-              <a:rPr lang="de-DE" dirty="0" smtClean="0"/>
+          </a:p>
+          <a:p>
+            <a:r>
+              <a:rPr lang="de-DE" dirty="0"/>
               <a:t>3. Erkläre den groben Ablauf: </a:t>
             </a:r>
-            <a:endParaRPr lang="de-DE" dirty="0"/>
-          </a:p>
-          <a:p>
-            <a:r>
-              <a:rPr lang="de-DE" dirty="0" smtClean="0"/>
+          </a:p>
+          <a:p>
+            <a:r>
+              <a:rPr lang="de-DE" dirty="0"/>
               <a:t>BEIDE suchen sich eine Figur aus programmieren nacheinander bis 3b, danach immer abwechselnd.</a:t>
             </a:r>
           </a:p>
           <a:p>
             <a:r>
-              <a:rPr lang="de-DE" dirty="0" smtClean="0"/>
+              <a:rPr lang="de-DE" dirty="0"/>
               <a:t>4. Ob die Bühne geleert wird oder nicht, sollen sie entscheiden.</a:t>
             </a:r>
           </a:p>
           <a:p>
             <a:r>
-              <a:rPr lang="de-DE" dirty="0" smtClean="0">
+              <a:rPr lang="de-DE" dirty="0">
                 <a:solidFill>
                   <a:srgbClr val="FF0000"/>
                 </a:solidFill>
@@ -5561,7 +5440,7 @@
           </a:p>
           <a:p>
             <a:r>
-              <a:rPr lang="de-DE" dirty="0" smtClean="0"/>
+              <a:rPr lang="de-DE" dirty="0"/>
               <a:t>5. Nachdem der Not-Aus eingeführt wurde -&gt; immer drücken nach jeden Versuch.</a:t>
             </a:r>
           </a:p>
@@ -5572,15 +5451,7 @@
                   <a:srgbClr val="FF0000"/>
                 </a:solidFill>
               </a:rPr>
-              <a:t>Achtung: </a:t>
-            </a:r>
-            <a:r>
-              <a:rPr lang="de-DE" dirty="0" smtClean="0">
-                <a:solidFill>
-                  <a:srgbClr val="FF0000"/>
-                </a:solidFill>
-              </a:rPr>
-              <a:t>Schleifen vor Änderung stoppen! </a:t>
+              <a:t>Achtung: Schleifen vor Änderung stoppen! </a:t>
             </a:r>
           </a:p>
           <a:p>
@@ -5592,18 +5463,13 @@
           </a:p>
           <a:p>
             <a:r>
-              <a:rPr lang="de-DE" dirty="0" smtClean="0">
+              <a:rPr lang="de-DE" dirty="0">
                 <a:solidFill>
                   <a:srgbClr val="FF0000"/>
                 </a:solidFill>
               </a:rPr>
               <a:t>Oft speichern! Am besten direkt zu Beginn!</a:t>
             </a:r>
-            <a:endParaRPr lang="de-DE" dirty="0">
-              <a:solidFill>
-                <a:srgbClr val="FF0000"/>
-              </a:solidFill>
-            </a:endParaRPr>
           </a:p>
         </p:txBody>
       </p:sp>
@@ -5630,13 +5496,13 @@
           <a:lstStyle/>
           <a:p>
             <a:r>
-              <a:rPr lang="de-DE" b="1" dirty="0" smtClean="0"/>
+              <a:rPr lang="de-DE" b="1" dirty="0"/>
               <a:t>RGB</a:t>
             </a:r>
           </a:p>
           <a:p>
             <a:r>
-              <a:rPr lang="de-DE" dirty="0" smtClean="0">
+              <a:rPr lang="de-DE" dirty="0">
                 <a:solidFill>
                   <a:srgbClr val="FF0000"/>
                 </a:solidFill>
@@ -5644,11 +5510,11 @@
               <a:t>Rot</a:t>
             </a:r>
             <a:r>
-              <a:rPr lang="de-DE" dirty="0" smtClean="0"/>
+              <a:rPr lang="de-DE" dirty="0"/>
               <a:t> – </a:t>
             </a:r>
             <a:r>
-              <a:rPr lang="de-DE" dirty="0" smtClean="0">
+              <a:rPr lang="de-DE" dirty="0">
                 <a:solidFill>
                   <a:srgbClr val="00B050"/>
                 </a:solidFill>
@@ -5656,11 +5522,11 @@
               <a:t>Grün</a:t>
             </a:r>
             <a:r>
-              <a:rPr lang="de-DE" dirty="0" smtClean="0"/>
+              <a:rPr lang="de-DE" dirty="0"/>
               <a:t> – </a:t>
             </a:r>
             <a:r>
-              <a:rPr lang="de-DE" dirty="0" smtClean="0">
+              <a:rPr lang="de-DE" dirty="0">
                 <a:solidFill>
                   <a:srgbClr val="0070C0"/>
                 </a:solidFill>
@@ -5668,13 +5534,13 @@
               <a:t>Blau</a:t>
             </a:r>
             <a:r>
-              <a:rPr lang="de-DE" dirty="0" smtClean="0"/>
+              <a:rPr lang="de-DE" dirty="0"/>
               <a:t> </a:t>
             </a:r>
           </a:p>
           <a:p>
             <a:r>
-              <a:rPr lang="de-DE" dirty="0" smtClean="0"/>
+              <a:rPr lang="de-DE" dirty="0"/>
               <a:t>Alle Farben sind damit möglich. Wie beim Fernseher, wenn man sehr dicht heran geht.</a:t>
             </a:r>
           </a:p>
@@ -5683,10 +5549,9 @@
           </a:p>
           <a:p>
             <a:r>
-              <a:rPr lang="de-DE" b="1" dirty="0" smtClean="0"/>
+              <a:rPr lang="de-DE" b="1" dirty="0"/>
               <a:t>Skala 0 - 255</a:t>
             </a:r>
-            <a:endParaRPr lang="de-DE" b="1" dirty="0"/>
           </a:p>
         </p:txBody>
       </p:sp>
@@ -5765,13 +5630,6 @@
   <p:clrMapOvr>
     <a:masterClrMapping/>
   </p:clrMapOvr>
-  <p:timing>
-    <p:tnLst>
-      <p:par>
-        <p:cTn id="1" dur="indefinite" restart="never" nodeType="tmRoot"/>
-      </p:par>
-    </p:tnLst>
-  </p:timing>
 </p:sld>
 </file>
 

</xml_diff>